<commit_message>
Add QR to powerpoint
</commit_message>
<xml_diff>
--- a/powerpoint/MudBlazor presentation.pptx
+++ b/powerpoint/MudBlazor presentation.pptx
@@ -5,7 +5,7 @@
     <p:sldMasterId id="2147483648" r:id="rId1"/>
   </p:sldMasterIdLst>
   <p:notesMasterIdLst>
-    <p:notesMasterId r:id="rId10"/>
+    <p:notesMasterId r:id="rId11"/>
   </p:notesMasterIdLst>
   <p:sldIdLst>
     <p:sldId id="256" r:id="rId2"/>
@@ -16,6 +16,7 @@
     <p:sldId id="262" r:id="rId7"/>
     <p:sldId id="264" r:id="rId8"/>
     <p:sldId id="265" r:id="rId9"/>
+    <p:sldId id="266" r:id="rId10"/>
   </p:sldIdLst>
   <p:sldSz cx="12192000" cy="6858000"/>
   <p:notesSz cx="6858000" cy="9144000"/>
@@ -6439,6 +6440,144 @@
       </p:par>
     </p:tnLst>
   </p:timing>
+</p:sld>
+</file>
+
+<file path=ppt/slides/slide9.xml><?xml version="1.0" encoding="utf-8"?>
+<p:sld xmlns:a="http://schemas.openxmlformats.org/drawingml/2006/main" xmlns:r="http://schemas.openxmlformats.org/officeDocument/2006/relationships" xmlns:p="http://schemas.openxmlformats.org/presentationml/2006/main">
+  <p:cSld>
+    <p:spTree>
+      <p:nvGrpSpPr>
+        <p:cNvPr id="1" name=""/>
+        <p:cNvGrpSpPr/>
+        <p:nvPr/>
+      </p:nvGrpSpPr>
+      <p:grpSpPr>
+        <a:xfrm>
+          <a:off x="0" y="0"/>
+          <a:ext cx="0" cy="0"/>
+          <a:chOff x="0" y="0"/>
+          <a:chExt cx="0" cy="0"/>
+        </a:xfrm>
+      </p:grpSpPr>
+      <p:sp>
+        <p:nvSpPr>
+          <p:cNvPr id="2" name="Title 1">
+            <a:extLst>
+              <a:ext uri="{FF2B5EF4-FFF2-40B4-BE49-F238E27FC236}">
+                <a16:creationId xmlns:a16="http://schemas.microsoft.com/office/drawing/2014/main" id="{453FF85C-C1BB-4F22-64C7-AECF27D53908}"/>
+              </a:ext>
+            </a:extLst>
+          </p:cNvPr>
+          <p:cNvSpPr>
+            <a:spLocks noGrp="1"/>
+          </p:cNvSpPr>
+          <p:nvPr>
+            <p:ph type="title"/>
+          </p:nvPr>
+        </p:nvSpPr>
+        <p:spPr/>
+        <p:txBody>
+          <a:bodyPr/>
+          <a:lstStyle/>
+          <a:p>
+            <a:r>
+              <a:rPr lang="en-GB" dirty="0"/>
+              <a:t>Thank you!</a:t>
+            </a:r>
+            <a:endParaRPr lang="LID4096" dirty="0"/>
+          </a:p>
+        </p:txBody>
+      </p:sp>
+      <p:sp>
+        <p:nvSpPr>
+          <p:cNvPr id="10" name="TextBox 9">
+            <a:extLst>
+              <a:ext uri="{FF2B5EF4-FFF2-40B4-BE49-F238E27FC236}">
+                <a16:creationId xmlns:a16="http://schemas.microsoft.com/office/drawing/2014/main" id="{8E03E127-5CA6-F769-8A64-848428540306}"/>
+              </a:ext>
+            </a:extLst>
+          </p:cNvPr>
+          <p:cNvSpPr txBox="1"/>
+          <p:nvPr/>
+        </p:nvSpPr>
+        <p:spPr>
+          <a:xfrm>
+            <a:off x="3010511" y="5459010"/>
+            <a:ext cx="6170978" cy="369332"/>
+          </a:xfrm>
+          <a:prstGeom prst="rect">
+            <a:avLst/>
+          </a:prstGeom>
+          <a:noFill/>
+        </p:spPr>
+        <p:txBody>
+          <a:bodyPr wrap="square" rtlCol="0">
+            <a:spAutoFit/>
+          </a:bodyPr>
+          <a:lstStyle/>
+          <a:p>
+            <a:pPr algn="ctr"/>
+            <a:r>
+              <a:rPr lang="en-GB" dirty="0"/>
+              <a:t>https://github.com/Rene-Sackers/presentation-mudblazor</a:t>
+            </a:r>
+            <a:endParaRPr lang="LID4096" dirty="0"/>
+          </a:p>
+        </p:txBody>
+      </p:sp>
+      <p:pic>
+        <p:nvPicPr>
+          <p:cNvPr id="12" name="Picture 11" descr="A qr code with a logo&#10;&#10;AI-generated content may be incorrect.">
+            <a:extLst>
+              <a:ext uri="{FF2B5EF4-FFF2-40B4-BE49-F238E27FC236}">
+                <a16:creationId xmlns:a16="http://schemas.microsoft.com/office/drawing/2014/main" id="{CF1D17FF-A84C-FDD0-EEF0-AE1B7E2FE2ED}"/>
+              </a:ext>
+            </a:extLst>
+          </p:cNvPr>
+          <p:cNvPicPr>
+            <a:picLocks noChangeAspect="1"/>
+          </p:cNvPicPr>
+          <p:nvPr/>
+        </p:nvPicPr>
+        <p:blipFill>
+          <a:blip r:embed="rId2"/>
+          <a:stretch>
+            <a:fillRect/>
+          </a:stretch>
+        </p:blipFill>
+        <p:spPr>
+          <a:xfrm>
+            <a:off x="3952576" y="1285576"/>
+            <a:ext cx="4286848" cy="4286848"/>
+          </a:xfrm>
+          <a:prstGeom prst="rect">
+            <a:avLst/>
+          </a:prstGeom>
+        </p:spPr>
+      </p:pic>
+    </p:spTree>
+    <p:extLst>
+      <p:ext uri="{BB962C8B-B14F-4D97-AF65-F5344CB8AC3E}">
+        <p14:creationId xmlns:p14="http://schemas.microsoft.com/office/powerpoint/2010/main" val="546408360"/>
+      </p:ext>
+    </p:extLst>
+  </p:cSld>
+  <p:clrMapOvr>
+    <a:masterClrMapping/>
+  </p:clrMapOvr>
+  <mc:AlternateContent xmlns:mc="http://schemas.openxmlformats.org/markup-compatibility/2006" xmlns:p159="http://schemas.microsoft.com/office/powerpoint/2015/09/main">
+    <mc:Choice Requires="p159">
+      <p:transition xmlns:p14="http://schemas.microsoft.com/office/powerpoint/2010/main" spd="slow" p14:dur="2000">
+        <p159:morph option="byObject"/>
+      </p:transition>
+    </mc:Choice>
+    <mc:Fallback xmlns="">
+      <p:transition spd="slow">
+        <p:fade/>
+      </p:transition>
+    </mc:Fallback>
+  </mc:AlternateContent>
 </p:sld>
 </file>
 

</xml_diff>